<commit_message>
Zostal wstep, zakonczenie i formatowanie
</commit_message>
<xml_diff>
--- a/Notatka/Rys/PowerPoint/podprobkowanie.pptx
+++ b/Notatka/Rys/PowerPoint/podprobkowanie.pptx
@@ -243,7 +243,7 @@
           <a:p>
             <a:fld id="{A5999D25-B856-4770-A064-2F29F2E54AE2}" type="datetimeFigureOut">
               <a:rPr lang="pl-PL" smtClean="0"/>
-              <a:t>2019-04-06</a:t>
+              <a:t>2019-06-05</a:t>
             </a:fld>
             <a:endParaRPr lang="pl-PL"/>
           </a:p>
@@ -413,7 +413,7 @@
           <a:p>
             <a:fld id="{A5999D25-B856-4770-A064-2F29F2E54AE2}" type="datetimeFigureOut">
               <a:rPr lang="pl-PL" smtClean="0"/>
-              <a:t>2019-04-06</a:t>
+              <a:t>2019-06-05</a:t>
             </a:fld>
             <a:endParaRPr lang="pl-PL"/>
           </a:p>
@@ -593,7 +593,7 @@
           <a:p>
             <a:fld id="{A5999D25-B856-4770-A064-2F29F2E54AE2}" type="datetimeFigureOut">
               <a:rPr lang="pl-PL" smtClean="0"/>
-              <a:t>2019-04-06</a:t>
+              <a:t>2019-06-05</a:t>
             </a:fld>
             <a:endParaRPr lang="pl-PL"/>
           </a:p>
@@ -763,7 +763,7 @@
           <a:p>
             <a:fld id="{A5999D25-B856-4770-A064-2F29F2E54AE2}" type="datetimeFigureOut">
               <a:rPr lang="pl-PL" smtClean="0"/>
-              <a:t>2019-04-06</a:t>
+              <a:t>2019-06-05</a:t>
             </a:fld>
             <a:endParaRPr lang="pl-PL"/>
           </a:p>
@@ -1009,7 +1009,7 @@
           <a:p>
             <a:fld id="{A5999D25-B856-4770-A064-2F29F2E54AE2}" type="datetimeFigureOut">
               <a:rPr lang="pl-PL" smtClean="0"/>
-              <a:t>2019-04-06</a:t>
+              <a:t>2019-06-05</a:t>
             </a:fld>
             <a:endParaRPr lang="pl-PL"/>
           </a:p>
@@ -1241,7 +1241,7 @@
           <a:p>
             <a:fld id="{A5999D25-B856-4770-A064-2F29F2E54AE2}" type="datetimeFigureOut">
               <a:rPr lang="pl-PL" smtClean="0"/>
-              <a:t>2019-04-06</a:t>
+              <a:t>2019-06-05</a:t>
             </a:fld>
             <a:endParaRPr lang="pl-PL"/>
           </a:p>
@@ -1608,7 +1608,7 @@
           <a:p>
             <a:fld id="{A5999D25-B856-4770-A064-2F29F2E54AE2}" type="datetimeFigureOut">
               <a:rPr lang="pl-PL" smtClean="0"/>
-              <a:t>2019-04-06</a:t>
+              <a:t>2019-06-05</a:t>
             </a:fld>
             <a:endParaRPr lang="pl-PL"/>
           </a:p>
@@ -1726,7 +1726,7 @@
           <a:p>
             <a:fld id="{A5999D25-B856-4770-A064-2F29F2E54AE2}" type="datetimeFigureOut">
               <a:rPr lang="pl-PL" smtClean="0"/>
-              <a:t>2019-04-06</a:t>
+              <a:t>2019-06-05</a:t>
             </a:fld>
             <a:endParaRPr lang="pl-PL"/>
           </a:p>
@@ -1821,7 +1821,7 @@
           <a:p>
             <a:fld id="{A5999D25-B856-4770-A064-2F29F2E54AE2}" type="datetimeFigureOut">
               <a:rPr lang="pl-PL" smtClean="0"/>
-              <a:t>2019-04-06</a:t>
+              <a:t>2019-06-05</a:t>
             </a:fld>
             <a:endParaRPr lang="pl-PL"/>
           </a:p>
@@ -2098,7 +2098,7 @@
           <a:p>
             <a:fld id="{A5999D25-B856-4770-A064-2F29F2E54AE2}" type="datetimeFigureOut">
               <a:rPr lang="pl-PL" smtClean="0"/>
-              <a:t>2019-04-06</a:t>
+              <a:t>2019-06-05</a:t>
             </a:fld>
             <a:endParaRPr lang="pl-PL"/>
           </a:p>
@@ -2351,7 +2351,7 @@
           <a:p>
             <a:fld id="{A5999D25-B856-4770-A064-2F29F2E54AE2}" type="datetimeFigureOut">
               <a:rPr lang="pl-PL" smtClean="0"/>
-              <a:t>2019-04-06</a:t>
+              <a:t>2019-06-05</a:t>
             </a:fld>
             <a:endParaRPr lang="pl-PL"/>
           </a:p>
@@ -2564,7 +2564,7 @@
           <a:p>
             <a:fld id="{A5999D25-B856-4770-A064-2F29F2E54AE2}" type="datetimeFigureOut">
               <a:rPr lang="pl-PL" smtClean="0"/>
-              <a:t>2019-04-06</a:t>
+              <a:t>2019-06-05</a:t>
             </a:fld>
             <a:endParaRPr lang="pl-PL"/>
           </a:p>
@@ -3065,11 +3065,7 @@
           <a:p>
             <a:r>
               <a:rPr lang="pl-PL" sz="1200" i="1" dirty="0" smtClean="0"/>
-              <a:t>  </a:t>
-            </a:r>
-            <a:r>
-              <a:rPr lang="pl-PL" sz="1200" i="1" dirty="0" smtClean="0"/>
-              <a:t>f</a:t>
+              <a:t>  f</a:t>
             </a:r>
             <a:r>
               <a:rPr lang="pl-PL" sz="1200" i="1" baseline="-25000" dirty="0" smtClean="0"/>
@@ -3197,11 +3193,7 @@
           <a:p>
             <a:r>
               <a:rPr lang="pl-PL" sz="1200" dirty="0" smtClean="0"/>
-              <a:t>Widmo </a:t>
-            </a:r>
-            <a:r>
-              <a:rPr lang="pl-PL" sz="1200" dirty="0" smtClean="0"/>
-              <a:t>ciągłe</a:t>
+              <a:t>Widmo ciągłe</a:t>
             </a:r>
             <a:endParaRPr lang="pl-PL" sz="1200" dirty="0"/>
           </a:p>
@@ -3555,11 +3547,7 @@
           <a:p>
             <a:r>
               <a:rPr lang="pl-PL" sz="1200" i="1" dirty="0" smtClean="0"/>
-              <a:t>  </a:t>
-            </a:r>
-            <a:r>
-              <a:rPr lang="pl-PL" sz="1200" i="1" dirty="0" smtClean="0"/>
-              <a:t>2f</a:t>
+              <a:t>  2f</a:t>
             </a:r>
             <a:r>
               <a:rPr lang="pl-PL" sz="1200" i="1" baseline="-25000" dirty="0" smtClean="0"/>
@@ -3623,11 +3611,7 @@
           <a:p>
             <a:r>
               <a:rPr lang="pl-PL" sz="1200" i="1" dirty="0" smtClean="0"/>
-              <a:t>  </a:t>
-            </a:r>
-            <a:r>
-              <a:rPr lang="pl-PL" sz="1200" i="1" dirty="0" smtClean="0"/>
-              <a:t>  -f</a:t>
+              <a:t>    -f</a:t>
             </a:r>
             <a:r>
               <a:rPr lang="pl-PL" sz="1200" i="1" baseline="-25000" dirty="0" smtClean="0"/>
@@ -3725,11 +3709,7 @@
           <a:p>
             <a:r>
               <a:rPr lang="pl-PL" sz="1200" dirty="0" smtClean="0"/>
-              <a:t>Widmo </a:t>
-            </a:r>
-            <a:r>
-              <a:rPr lang="pl-PL" sz="1200" dirty="0" smtClean="0"/>
-              <a:t>dyskretne</a:t>
+              <a:t>Widmo dyskretne</a:t>
             </a:r>
             <a:endParaRPr lang="pl-PL" sz="1200" dirty="0"/>
           </a:p>
@@ -4040,11 +4020,7 @@
           <a:p>
             <a:r>
               <a:rPr lang="pl-PL" sz="1200" i="1" dirty="0" smtClean="0"/>
-              <a:t>  </a:t>
-            </a:r>
-            <a:r>
-              <a:rPr lang="pl-PL" sz="1200" i="1" dirty="0" smtClean="0"/>
-              <a:t>f</a:t>
+              <a:t>  f</a:t>
             </a:r>
             <a:r>
               <a:rPr lang="pl-PL" sz="1200" i="1" baseline="-25000" dirty="0" smtClean="0"/>
@@ -4766,11 +4742,7 @@
           <a:p>
             <a:r>
               <a:rPr lang="pl-PL" sz="1200" i="1" dirty="0" smtClean="0"/>
-              <a:t> </a:t>
-            </a:r>
-            <a:r>
-              <a:rPr lang="pl-PL" sz="1200" i="1" dirty="0" smtClean="0"/>
-              <a:t>f</a:t>
+              <a:t> f</a:t>
             </a:r>
             <a:r>
               <a:rPr lang="pl-PL" sz="1200" i="1" baseline="-25000" dirty="0" smtClean="0"/>
@@ -4841,6 +4813,198 @@
               <a:t>(b)</a:t>
             </a:r>
             <a:endParaRPr lang="pl-PL" dirty="0"/>
+          </a:p>
+        </p:txBody>
+      </p:sp>
+      <p:sp>
+        <p:nvSpPr>
+          <p:cNvPr id="3" name="Prostokąt 2"/>
+          <p:cNvSpPr/>
+          <p:nvPr/>
+        </p:nvSpPr>
+        <p:spPr>
+          <a:xfrm>
+            <a:off x="9864168" y="609638"/>
+            <a:ext cx="632102" cy="377523"/>
+          </a:xfrm>
+          <a:prstGeom prst="rect">
+            <a:avLst/>
+          </a:prstGeom>
+          <a:pattFill prst="wdUpDiag">
+            <a:fgClr>
+              <a:schemeClr val="tx1"/>
+            </a:fgClr>
+            <a:bgClr>
+              <a:schemeClr val="bg1"/>
+            </a:bgClr>
+          </a:pattFill>
+          <a:ln w="12700">
+            <a:solidFill>
+              <a:schemeClr val="tx1"/>
+            </a:solidFill>
+          </a:ln>
+        </p:spPr>
+        <p:style>
+          <a:lnRef idx="2">
+            <a:schemeClr val="accent1">
+              <a:shade val="50000"/>
+            </a:schemeClr>
+          </a:lnRef>
+          <a:fillRef idx="1">
+            <a:schemeClr val="accent1"/>
+          </a:fillRef>
+          <a:effectRef idx="0">
+            <a:schemeClr val="accent1"/>
+          </a:effectRef>
+          <a:fontRef idx="minor">
+            <a:schemeClr val="lt1"/>
+          </a:fontRef>
+        </p:style>
+        <p:txBody>
+          <a:bodyPr rtlCol="0" anchor="ctr"/>
+          <a:lstStyle/>
+          <a:p>
+            <a:pPr algn="ctr"/>
+            <a:endParaRPr lang="pl-PL" dirty="0">
+              <a:pattFill prst="ltUpDiag">
+                <a:fgClr>
+                  <a:schemeClr val="tx1"/>
+                </a:fgClr>
+                <a:bgClr>
+                  <a:schemeClr val="bg1"/>
+                </a:bgClr>
+              </a:pattFill>
+            </a:endParaRPr>
+          </a:p>
+        </p:txBody>
+      </p:sp>
+      <p:sp>
+        <p:nvSpPr>
+          <p:cNvPr id="51" name="Prostokąt 50"/>
+          <p:cNvSpPr/>
+          <p:nvPr/>
+        </p:nvSpPr>
+        <p:spPr>
+          <a:xfrm>
+            <a:off x="9864168" y="1133951"/>
+            <a:ext cx="632102" cy="377523"/>
+          </a:xfrm>
+          <a:prstGeom prst="rect">
+            <a:avLst/>
+          </a:prstGeom>
+          <a:pattFill prst="wdUpDiag">
+            <a:fgClr>
+              <a:srgbClr val="BFBFBF"/>
+            </a:fgClr>
+            <a:bgClr>
+              <a:schemeClr val="bg1"/>
+            </a:bgClr>
+          </a:pattFill>
+          <a:ln w="12700">
+            <a:solidFill>
+              <a:schemeClr val="tx1"/>
+            </a:solidFill>
+          </a:ln>
+        </p:spPr>
+        <p:style>
+          <a:lnRef idx="2">
+            <a:schemeClr val="accent1">
+              <a:shade val="50000"/>
+            </a:schemeClr>
+          </a:lnRef>
+          <a:fillRef idx="1">
+            <a:schemeClr val="accent1"/>
+          </a:fillRef>
+          <a:effectRef idx="0">
+            <a:schemeClr val="accent1"/>
+          </a:effectRef>
+          <a:fontRef idx="minor">
+            <a:schemeClr val="lt1"/>
+          </a:fontRef>
+        </p:style>
+        <p:txBody>
+          <a:bodyPr rtlCol="0" anchor="ctr"/>
+          <a:lstStyle/>
+          <a:p>
+            <a:pPr algn="ctr"/>
+            <a:endParaRPr lang="pl-PL" dirty="0">
+              <a:pattFill prst="ltUpDiag">
+                <a:fgClr>
+                  <a:schemeClr val="tx1"/>
+                </a:fgClr>
+                <a:bgClr>
+                  <a:schemeClr val="bg1"/>
+                </a:bgClr>
+              </a:pattFill>
+            </a:endParaRPr>
+          </a:p>
+        </p:txBody>
+      </p:sp>
+      <p:sp>
+        <p:nvSpPr>
+          <p:cNvPr id="54" name="pole tekstowe 53"/>
+          <p:cNvSpPr txBox="1"/>
+          <p:nvPr/>
+        </p:nvSpPr>
+        <p:spPr>
+          <a:xfrm>
+            <a:off x="10496270" y="655804"/>
+            <a:ext cx="1332865" cy="276999"/>
+          </a:xfrm>
+          <a:prstGeom prst="rect">
+            <a:avLst/>
+          </a:prstGeom>
+          <a:noFill/>
+        </p:spPr>
+        <p:txBody>
+          <a:bodyPr wrap="none" rtlCol="0">
+            <a:spAutoFit/>
+          </a:bodyPr>
+          <a:lstStyle/>
+          <a:p>
+            <a:r>
+              <a:rPr lang="pl-PL" sz="1200" dirty="0" smtClean="0"/>
+              <a:t>Widmo </a:t>
+            </a:r>
+            <a:r>
+              <a:rPr lang="pl-PL" sz="1200" dirty="0" smtClean="0"/>
+              <a:t>oryginalne</a:t>
+            </a:r>
+            <a:endParaRPr lang="pl-PL" sz="1200" dirty="0"/>
+          </a:p>
+        </p:txBody>
+      </p:sp>
+      <p:sp>
+        <p:nvSpPr>
+          <p:cNvPr id="55" name="pole tekstowe 54"/>
+          <p:cNvSpPr txBox="1"/>
+          <p:nvPr/>
+        </p:nvSpPr>
+        <p:spPr>
+          <a:xfrm>
+            <a:off x="10496269" y="1184212"/>
+            <a:ext cx="1335045" cy="276999"/>
+          </a:xfrm>
+          <a:prstGeom prst="rect">
+            <a:avLst/>
+          </a:prstGeom>
+          <a:noFill/>
+        </p:spPr>
+        <p:txBody>
+          <a:bodyPr wrap="none" rtlCol="0">
+            <a:spAutoFit/>
+          </a:bodyPr>
+          <a:lstStyle/>
+          <a:p>
+            <a:r>
+              <a:rPr lang="pl-PL" sz="1200" dirty="0" smtClean="0"/>
+              <a:t>Widmo </a:t>
+            </a:r>
+            <a:r>
+              <a:rPr lang="pl-PL" sz="1200" dirty="0" smtClean="0"/>
+              <a:t>powielone</a:t>
+            </a:r>
+            <a:endParaRPr lang="pl-PL" sz="1200" dirty="0"/>
           </a:p>
         </p:txBody>
       </p:sp>
@@ -4854,6 +5018,13 @@
   <p:clrMapOvr>
     <a:masterClrMapping/>
   </p:clrMapOvr>
+  <p:timing>
+    <p:tnLst>
+      <p:par>
+        <p:cTn id="1" dur="indefinite" restart="never" nodeType="tmRoot"/>
+      </p:par>
+    </p:tnLst>
+  </p:timing>
 </p:sld>
 </file>
 

</xml_diff>